<commit_message>
Final updates for RailsConf2017
</commit_message>
<xml_diff>
--- a/presentations/railsconf/2017/reporting_on_rails.pptx
+++ b/presentations/railsconf/2017/reporting_on_rails.pptx
@@ -238,7 +238,7 @@
           <a:p>
             <a:fld id="{E18864BC-3F83-194B-8291-5A25597A9563}" type="datetimeFigureOut">
               <a:rPr lang="en-US" smtClean="0"/>
-              <a:t>4/26/17</a:t>
+              <a:t>4/27/17</a:t>
             </a:fld>
             <a:endParaRPr lang="en-US"/>
           </a:p>
@@ -403,7 +403,7 @@
           <a:p>
             <a:fld id="{83E7C617-CD75-1346-B314-03A29C3CAA7B}" type="datetimeFigureOut">
               <a:rPr lang="en-US" smtClean="0"/>
-              <a:t>4/26/17</a:t>
+              <a:t>4/27/17</a:t>
             </a:fld>
             <a:endParaRPr lang="en-US"/>
           </a:p>
@@ -2284,19 +2284,11 @@
           <a:p>
             <a:r>
               <a:rPr lang="en-US" dirty="0" smtClean="0"/>
-              <a:t>Switch your application to </a:t>
-            </a:r>
-            <a:r>
-              <a:rPr lang="en-US" dirty="0" smtClean="0"/>
-              <a:t>sequel?</a:t>
+              <a:t>Switch your application to sequel?</a:t>
             </a:r>
             <a:r>
               <a:rPr lang="en-US" baseline="0" dirty="0" smtClean="0"/>
-              <a:t> </a:t>
-            </a:r>
-            <a:r>
-              <a:rPr lang="en-US" baseline="0" dirty="0" smtClean="0"/>
-              <a:t>- </a:t>
+              <a:t> - </a:t>
             </a:r>
             <a:r>
               <a:rPr lang="en-US" dirty="0" smtClean="0"/>
@@ -2773,7 +2765,15 @@
           <a:p>
             <a:r>
               <a:rPr lang="en-US" baseline="0" dirty="0" smtClean="0"/>
-              <a:t>Bill optimization, procurement and tier 1 tech support</a:t>
+              <a:t>Bill optimization</a:t>
+            </a:r>
+            <a:r>
+              <a:rPr lang="en-US" baseline="0" dirty="0" smtClean="0"/>
+              <a:t>, device </a:t>
+            </a:r>
+            <a:r>
+              <a:rPr lang="en-US" baseline="0" dirty="0" smtClean="0"/>
+              <a:t>procurement and tier 1 tech support</a:t>
             </a:r>
             <a:endParaRPr lang="en-US" dirty="0"/>
           </a:p>
@@ -4136,7 +4136,7 @@
           <a:p>
             <a:fld id="{F5C83B3B-F4D8-A846-95D1-49CF927F713A}" type="datetimeFigureOut">
               <a:rPr lang="en-US" smtClean="0"/>
-              <a:t>4/26/17</a:t>
+              <a:t>4/27/17</a:t>
             </a:fld>
             <a:endParaRPr lang="en-US"/>
           </a:p>
@@ -4306,7 +4306,7 @@
           <a:p>
             <a:fld id="{F5C83B3B-F4D8-A846-95D1-49CF927F713A}" type="datetimeFigureOut">
               <a:rPr lang="en-US" smtClean="0"/>
-              <a:t>4/26/17</a:t>
+              <a:t>4/27/17</a:t>
             </a:fld>
             <a:endParaRPr lang="en-US"/>
           </a:p>
@@ -4486,7 +4486,7 @@
           <a:p>
             <a:fld id="{F5C83B3B-F4D8-A846-95D1-49CF927F713A}" type="datetimeFigureOut">
               <a:rPr lang="en-US" smtClean="0"/>
-              <a:t>4/26/17</a:t>
+              <a:t>4/27/17</a:t>
             </a:fld>
             <a:endParaRPr lang="en-US"/>
           </a:p>
@@ -4656,7 +4656,7 @@
           <a:p>
             <a:fld id="{F5C83B3B-F4D8-A846-95D1-49CF927F713A}" type="datetimeFigureOut">
               <a:rPr lang="en-US" smtClean="0"/>
-              <a:t>4/26/17</a:t>
+              <a:t>4/27/17</a:t>
             </a:fld>
             <a:endParaRPr lang="en-US"/>
           </a:p>
@@ -4902,7 +4902,7 @@
           <a:p>
             <a:fld id="{F5C83B3B-F4D8-A846-95D1-49CF927F713A}" type="datetimeFigureOut">
               <a:rPr lang="en-US" smtClean="0"/>
-              <a:t>4/26/17</a:t>
+              <a:t>4/27/17</a:t>
             </a:fld>
             <a:endParaRPr lang="en-US"/>
           </a:p>
@@ -5134,7 +5134,7 @@
           <a:p>
             <a:fld id="{F5C83B3B-F4D8-A846-95D1-49CF927F713A}" type="datetimeFigureOut">
               <a:rPr lang="en-US" smtClean="0"/>
-              <a:t>4/26/17</a:t>
+              <a:t>4/27/17</a:t>
             </a:fld>
             <a:endParaRPr lang="en-US"/>
           </a:p>
@@ -5501,7 +5501,7 @@
           <a:p>
             <a:fld id="{F5C83B3B-F4D8-A846-95D1-49CF927F713A}" type="datetimeFigureOut">
               <a:rPr lang="en-US" smtClean="0"/>
-              <a:t>4/26/17</a:t>
+              <a:t>4/27/17</a:t>
             </a:fld>
             <a:endParaRPr lang="en-US"/>
           </a:p>
@@ -5619,7 +5619,7 @@
           <a:p>
             <a:fld id="{F5C83B3B-F4D8-A846-95D1-49CF927F713A}" type="datetimeFigureOut">
               <a:rPr lang="en-US" smtClean="0"/>
-              <a:t>4/26/17</a:t>
+              <a:t>4/27/17</a:t>
             </a:fld>
             <a:endParaRPr lang="en-US"/>
           </a:p>
@@ -5714,7 +5714,7 @@
           <a:p>
             <a:fld id="{F5C83B3B-F4D8-A846-95D1-49CF927F713A}" type="datetimeFigureOut">
               <a:rPr lang="en-US" smtClean="0"/>
-              <a:t>4/26/17</a:t>
+              <a:t>4/27/17</a:t>
             </a:fld>
             <a:endParaRPr lang="en-US"/>
           </a:p>
@@ -5991,7 +5991,7 @@
           <a:p>
             <a:fld id="{F5C83B3B-F4D8-A846-95D1-49CF927F713A}" type="datetimeFigureOut">
               <a:rPr lang="en-US" smtClean="0"/>
-              <a:t>4/26/17</a:t>
+              <a:t>4/27/17</a:t>
             </a:fld>
             <a:endParaRPr lang="en-US"/>
           </a:p>
@@ -6244,7 +6244,7 @@
           <a:p>
             <a:fld id="{F5C83B3B-F4D8-A846-95D1-49CF927F713A}" type="datetimeFigureOut">
               <a:rPr lang="en-US" smtClean="0"/>
-              <a:t>4/26/17</a:t>
+              <a:t>4/27/17</a:t>
             </a:fld>
             <a:endParaRPr lang="en-US"/>
           </a:p>
@@ -6457,7 +6457,7 @@
           <a:p>
             <a:fld id="{F5C83B3B-F4D8-A846-95D1-49CF927F713A}" type="datetimeFigureOut">
               <a:rPr lang="en-US" smtClean="0"/>
-              <a:t>4/26/17</a:t>
+              <a:t>4/27/17</a:t>
             </a:fld>
             <a:endParaRPr lang="en-US"/>
           </a:p>
@@ -22824,8 +22824,13 @@
           <a:p>
             <a:r>
               <a:rPr lang="en-US" dirty="0"/>
-              <a:t>Index liberally where needed</a:t>
-            </a:r>
+              <a:t>Index </a:t>
+            </a:r>
+            <a:r>
+              <a:rPr lang="en-US" dirty="0" smtClean="0"/>
+              <a:t>wisely</a:t>
+            </a:r>
+            <a:endParaRPr lang="en-US" dirty="0"/>
           </a:p>
           <a:p>
             <a:pPr lvl="1"/>

</xml_diff>